<commit_message>
update for mar31 cohort
</commit_message>
<xml_diff>
--- a/W02D2 - Data Transformation.pptx
+++ b/W02D2 - Data Transformation.pptx
@@ -20842,7 +20842,7 @@
           </a:bodyPr>
           <a:lstStyle/>
           <a:p>
-            <a:pPr marL="342900" lvl="0" indent="-342900" rtl="0">
+            <a:pPr lvl="0" rtl="0">
               <a:lnSpc>
                 <a:spcPct val="115000"/>
               </a:lnSpc>
@@ -20852,74 +20852,6 @@
               <a:spcAft>
                 <a:spcPts val="0"/>
               </a:spcAft>
-              <a:buFont typeface="Arial" panose="020B0604020202020204" pitchFamily="34" charset="0"/>
-              <a:buChar char="•"/>
-            </a:pPr>
-            <a:r>
-              <a:rPr lang="en" sz="1900" b="1" dirty="0">
-                <a:solidFill>
-                  <a:schemeClr val="dk2"/>
-                </a:solidFill>
-              </a:rPr>
-              <a:t>Something on a broken leg or arm?</a:t>
-            </a:r>
-          </a:p>
-          <a:p>
-            <a:pPr marL="342900" lvl="0" indent="-342900" rtl="0">
-              <a:lnSpc>
-                <a:spcPct val="115000"/>
-              </a:lnSpc>
-              <a:spcBef>
-                <a:spcPts val="0"/>
-              </a:spcBef>
-              <a:spcAft>
-                <a:spcPts val="0"/>
-              </a:spcAft>
-              <a:buFont typeface="Arial" panose="020B0604020202020204" pitchFamily="34" charset="0"/>
-              <a:buChar char="•"/>
-            </a:pPr>
-            <a:endParaRPr lang="en" sz="1900" b="1" dirty="0">
-              <a:solidFill>
-                <a:schemeClr val="dk2"/>
-              </a:solidFill>
-            </a:endParaRPr>
-          </a:p>
-          <a:p>
-            <a:pPr marL="342900" lvl="0" indent="-342900" rtl="0">
-              <a:lnSpc>
-                <a:spcPct val="115000"/>
-              </a:lnSpc>
-              <a:spcBef>
-                <a:spcPts val="0"/>
-              </a:spcBef>
-              <a:spcAft>
-                <a:spcPts val="0"/>
-              </a:spcAft>
-              <a:buFont typeface="Arial" panose="020B0604020202020204" pitchFamily="34" charset="0"/>
-              <a:buChar char="•"/>
-            </a:pPr>
-            <a:r>
-              <a:rPr lang="en" sz="1900" b="1" dirty="0">
-                <a:solidFill>
-                  <a:schemeClr val="dk2"/>
-                </a:solidFill>
-              </a:rPr>
-              <a:t>A spell from Harry Potter?</a:t>
-            </a:r>
-          </a:p>
-          <a:p>
-            <a:pPr marL="342900" lvl="0" indent="-342900" rtl="0">
-              <a:lnSpc>
-                <a:spcPct val="115000"/>
-              </a:lnSpc>
-              <a:spcBef>
-                <a:spcPts val="0"/>
-              </a:spcBef>
-              <a:spcAft>
-                <a:spcPts val="0"/>
-              </a:spcAft>
-              <a:buFont typeface="Arial" panose="020B0604020202020204" pitchFamily="34" charset="0"/>
-              <a:buChar char="•"/>
             </a:pPr>
             <a:endParaRPr lang="en" sz="1900" b="1" dirty="0">
               <a:solidFill>
@@ -23617,7 +23549,7 @@
           </a:bodyPr>
           <a:lstStyle/>
           <a:p>
-            <a:pPr marL="342900" lvl="0" indent="-342900" rtl="0">
+            <a:pPr lvl="0" rtl="0">
               <a:lnSpc>
                 <a:spcPct val="115000"/>
               </a:lnSpc>
@@ -23627,74 +23559,6 @@
               <a:spcAft>
                 <a:spcPts val="0"/>
               </a:spcAft>
-              <a:buFont typeface="Arial" panose="020B0604020202020204" pitchFamily="34" charset="0"/>
-              <a:buChar char="•"/>
-            </a:pPr>
-            <a:r>
-              <a:rPr lang="en" sz="1900" b="1" dirty="0">
-                <a:solidFill>
-                  <a:schemeClr val="dk2"/>
-                </a:solidFill>
-              </a:rPr>
-              <a:t>Allow for air to freely flow from inside/out or outside/in?</a:t>
-            </a:r>
-          </a:p>
-          <a:p>
-            <a:pPr marL="342900" lvl="0" indent="-342900" rtl="0">
-              <a:lnSpc>
-                <a:spcPct val="115000"/>
-              </a:lnSpc>
-              <a:spcBef>
-                <a:spcPts val="0"/>
-              </a:spcBef>
-              <a:spcAft>
-                <a:spcPts val="0"/>
-              </a:spcAft>
-              <a:buFont typeface="Arial" panose="020B0604020202020204" pitchFamily="34" charset="0"/>
-              <a:buChar char="•"/>
-            </a:pPr>
-            <a:endParaRPr lang="en" sz="1900" b="1" dirty="0">
-              <a:solidFill>
-                <a:schemeClr val="dk2"/>
-              </a:solidFill>
-            </a:endParaRPr>
-          </a:p>
-          <a:p>
-            <a:pPr marL="342900" lvl="0" indent="-342900" rtl="0">
-              <a:lnSpc>
-                <a:spcPct val="115000"/>
-              </a:lnSpc>
-              <a:spcBef>
-                <a:spcPts val="0"/>
-              </a:spcBef>
-              <a:spcAft>
-                <a:spcPts val="0"/>
-              </a:spcAft>
-              <a:buFont typeface="Arial" panose="020B0604020202020204" pitchFamily="34" charset="0"/>
-              <a:buChar char="•"/>
-            </a:pPr>
-            <a:r>
-              <a:rPr lang="en" sz="1900" b="1" dirty="0">
-                <a:solidFill>
-                  <a:schemeClr val="dk2"/>
-                </a:solidFill>
-              </a:rPr>
-              <a:t>Allow for user to look outside?</a:t>
-            </a:r>
-          </a:p>
-          <a:p>
-            <a:pPr marL="342900" lvl="0" indent="-342900" rtl="0">
-              <a:lnSpc>
-                <a:spcPct val="115000"/>
-              </a:lnSpc>
-              <a:spcBef>
-                <a:spcPts val="0"/>
-              </a:spcBef>
-              <a:spcAft>
-                <a:spcPts val="0"/>
-              </a:spcAft>
-              <a:buFont typeface="Arial" panose="020B0604020202020204" pitchFamily="34" charset="0"/>
-              <a:buChar char="•"/>
             </a:pPr>
             <a:endParaRPr lang="en" sz="1900" b="1" dirty="0">
               <a:solidFill>
@@ -30217,8 +30081,28 @@
                   <a:schemeClr val="dk2"/>
                 </a:solidFill>
               </a:rPr>
-              <a:t>Opening arguments in court?</a:t>
+              <a:t>A conditional expression in SQL (usually in SELECT).</a:t>
             </a:r>
+          </a:p>
+          <a:p>
+            <a:pPr marL="342900" lvl="0" indent="-342900" rtl="0">
+              <a:lnSpc>
+                <a:spcPct val="115000"/>
+              </a:lnSpc>
+              <a:spcBef>
+                <a:spcPts val="0"/>
+              </a:spcBef>
+              <a:spcAft>
+                <a:spcPts val="0"/>
+              </a:spcAft>
+              <a:buFont typeface="Arial" panose="020B0604020202020204" pitchFamily="34" charset="0"/>
+              <a:buChar char="•"/>
+            </a:pPr>
+            <a:endParaRPr lang="en" sz="1900" b="1" dirty="0">
+              <a:solidFill>
+                <a:schemeClr val="dk2"/>
+              </a:solidFill>
+            </a:endParaRPr>
           </a:p>
           <a:p>
             <a:pPr marL="342900" lvl="0" indent="-342900" rtl="0">
@@ -30240,8 +30124,28 @@
                   <a:schemeClr val="dk2"/>
                 </a:solidFill>
               </a:rPr>
-              <a:t>Complimenting someone’s briefcase?</a:t>
+              <a:t>Used to create a new column in the result table (mostly).</a:t>
             </a:r>
+          </a:p>
+          <a:p>
+            <a:pPr marL="342900" lvl="0" indent="-342900" rtl="0">
+              <a:lnSpc>
+                <a:spcPct val="115000"/>
+              </a:lnSpc>
+              <a:spcBef>
+                <a:spcPts val="0"/>
+              </a:spcBef>
+              <a:spcAft>
+                <a:spcPts val="0"/>
+              </a:spcAft>
+              <a:buFont typeface="Arial" panose="020B0604020202020204" pitchFamily="34" charset="0"/>
+              <a:buChar char="•"/>
+            </a:pPr>
+            <a:endParaRPr lang="en" sz="1900" b="1" dirty="0">
+              <a:solidFill>
+                <a:schemeClr val="dk2"/>
+              </a:solidFill>
+            </a:endParaRPr>
           </a:p>
           <a:p>
             <a:pPr marL="342900" lvl="0" indent="-342900" rtl="0">
@@ -30263,7 +30167,7 @@
                   <a:schemeClr val="dk2"/>
                 </a:solidFill>
               </a:rPr>
-              <a:t>Declaring the letter capitalization for a project?</a:t>
+              <a:t>Used to filter existing columns as well.</a:t>
             </a:r>
           </a:p>
           <a:p>
@@ -30280,60 +30184,11 @@
               <a:buFont typeface="Arial" panose="020B0604020202020204" pitchFamily="34" charset="0"/>
               <a:buChar char="•"/>
             </a:pPr>
-            <a:r>
-              <a:rPr lang="en" sz="1900" b="1" dirty="0">
-                <a:solidFill>
-                  <a:schemeClr val="dk2"/>
-                </a:solidFill>
-              </a:rPr>
-              <a:t>A conditional expression in SQL (usually in SELECT).</a:t>
-            </a:r>
-          </a:p>
-          <a:p>
-            <a:pPr marL="342900" lvl="0" indent="-342900" rtl="0">
-              <a:lnSpc>
-                <a:spcPct val="115000"/>
-              </a:lnSpc>
-              <a:spcBef>
-                <a:spcPts val="0"/>
-              </a:spcBef>
-              <a:spcAft>
-                <a:spcPts val="0"/>
-              </a:spcAft>
-              <a:buFont typeface="Arial" panose="020B0604020202020204" pitchFamily="34" charset="0"/>
-              <a:buChar char="•"/>
-            </a:pPr>
-            <a:r>
-              <a:rPr lang="en" sz="1900" b="1" dirty="0">
-                <a:solidFill>
-                  <a:schemeClr val="dk2"/>
-                </a:solidFill>
-              </a:rPr>
-              <a:t>Used to create a new column in the result table (mostly).</a:t>
-            </a:r>
-          </a:p>
-          <a:p>
-            <a:pPr marL="342900" lvl="0" indent="-342900" rtl="0">
-              <a:lnSpc>
-                <a:spcPct val="115000"/>
-              </a:lnSpc>
-              <a:spcBef>
-                <a:spcPts val="0"/>
-              </a:spcBef>
-              <a:spcAft>
-                <a:spcPts val="0"/>
-              </a:spcAft>
-              <a:buFont typeface="Arial" panose="020B0604020202020204" pitchFamily="34" charset="0"/>
-              <a:buChar char="•"/>
-            </a:pPr>
-            <a:r>
-              <a:rPr lang="en" sz="1900" b="1" dirty="0">
-                <a:solidFill>
-                  <a:schemeClr val="dk2"/>
-                </a:solidFill>
-              </a:rPr>
-              <a:t>Used to filter existing columns as well.</a:t>
-            </a:r>
+            <a:endParaRPr lang="en" sz="1900" b="1" dirty="0">
+              <a:solidFill>
+                <a:schemeClr val="dk2"/>
+              </a:solidFill>
+            </a:endParaRPr>
           </a:p>
           <a:p>
             <a:pPr marL="342900" lvl="0" indent="-342900" rtl="0">

</xml_diff>